<commit_message>
Update bzgl. Authorization Roles ... Hands On+
</commit_message>
<xml_diff>
--- a/CDS presentation/Tag1_Data Modeling with Core Data Services.pptx
+++ b/CDS presentation/Tag1_Data Modeling with Core Data Services.pptx
@@ -5,7 +5,7 @@
     <p:sldMasterId id="2147483648" r:id="rId1"/>
   </p:sldMasterIdLst>
   <p:notesMasterIdLst>
-    <p:notesMasterId r:id="rId41"/>
+    <p:notesMasterId r:id="rId42"/>
   </p:notesMasterIdLst>
   <p:sldIdLst>
     <p:sldId id="282" r:id="rId2"/>
@@ -46,7 +46,8 @@
     <p:sldId id="337" r:id="rId37"/>
     <p:sldId id="341" r:id="rId38"/>
     <p:sldId id="342" r:id="rId39"/>
-    <p:sldId id="338" r:id="rId40"/>
+    <p:sldId id="343" r:id="rId40"/>
+    <p:sldId id="338" r:id="rId41"/>
   </p:sldIdLst>
   <p:sldSz cx="12192000" cy="6858000"/>
   <p:notesSz cx="6858000" cy="9144000"/>
@@ -3230,6 +3231,90 @@
     </a:lvl9pPr>
   </p:notesStyle>
 </p:notesMaster>
+</file>
+
+<file path=ppt/notesSlides/notesSlide1.xml><?xml version="1.0" encoding="utf-8"?>
+<p:notes xmlns:a="http://schemas.openxmlformats.org/drawingml/2006/main" xmlns:r="http://schemas.openxmlformats.org/officeDocument/2006/relationships" xmlns:p="http://schemas.openxmlformats.org/presentationml/2006/main">
+  <p:cSld>
+    <p:spTree>
+      <p:nvGrpSpPr>
+        <p:cNvPr id="1" name=""/>
+        <p:cNvGrpSpPr/>
+        <p:nvPr/>
+      </p:nvGrpSpPr>
+      <p:grpSpPr>
+        <a:xfrm>
+          <a:off x="0" y="0"/>
+          <a:ext cx="0" cy="0"/>
+          <a:chOff x="0" y="0"/>
+          <a:chExt cx="0" cy="0"/>
+        </a:xfrm>
+      </p:grpSpPr>
+      <p:sp>
+        <p:nvSpPr>
+          <p:cNvPr id="2" name="Folienbildplatzhalter 1"/>
+          <p:cNvSpPr>
+            <a:spLocks noGrp="1" noRot="1" noChangeAspect="1"/>
+          </p:cNvSpPr>
+          <p:nvPr>
+            <p:ph type="sldImg"/>
+          </p:nvPr>
+        </p:nvSpPr>
+        <p:spPr/>
+      </p:sp>
+      <p:sp>
+        <p:nvSpPr>
+          <p:cNvPr id="3" name="Notizenplatzhalter 2"/>
+          <p:cNvSpPr>
+            <a:spLocks noGrp="1"/>
+          </p:cNvSpPr>
+          <p:nvPr>
+            <p:ph type="body" idx="1"/>
+          </p:nvPr>
+        </p:nvSpPr>
+        <p:spPr/>
+        <p:txBody>
+          <a:bodyPr/>
+          <a:lstStyle/>
+          <a:p>
+            <a:endParaRPr lang="de-DE"/>
+          </a:p>
+        </p:txBody>
+      </p:sp>
+      <p:sp>
+        <p:nvSpPr>
+          <p:cNvPr id="4" name="Foliennummernplatzhalter 3"/>
+          <p:cNvSpPr>
+            <a:spLocks noGrp="1"/>
+          </p:cNvSpPr>
+          <p:nvPr>
+            <p:ph type="sldNum" sz="quarter" idx="5"/>
+          </p:nvPr>
+        </p:nvSpPr>
+        <p:spPr/>
+        <p:txBody>
+          <a:bodyPr/>
+          <a:lstStyle/>
+          <a:p>
+            <a:fld id="{DC0C8601-5E09-0E4C-A79E-D4DC8377D91B}" type="slidenum">
+              <a:rPr lang="de-DE" smtClean="0"/>
+              <a:t>39</a:t>
+            </a:fld>
+            <a:endParaRPr lang="de-DE"/>
+          </a:p>
+        </p:txBody>
+      </p:sp>
+    </p:spTree>
+    <p:extLst>
+      <p:ext uri="{BB962C8B-B14F-4D97-AF65-F5344CB8AC3E}">
+        <p14:creationId xmlns:p14="http://schemas.microsoft.com/office/powerpoint/2010/main" val="732061152"/>
+      </p:ext>
+    </p:extLst>
+  </p:cSld>
+  <p:clrMapOvr>
+    <a:masterClrMapping/>
+  </p:clrMapOvr>
+</p:notes>
 </file>
 
 <file path=ppt/slideLayouts/slideLayout1.xml><?xml version="1.0" encoding="utf-8"?>
@@ -17287,6 +17372,14 @@
 <file path=ppt/slides/slide27.xml><?xml version="1.0" encoding="utf-8"?>
 <p:sld xmlns:a="http://schemas.openxmlformats.org/drawingml/2006/main" xmlns:r="http://schemas.openxmlformats.org/officeDocument/2006/relationships" xmlns:p="http://schemas.openxmlformats.org/presentationml/2006/main">
   <p:cSld>
+    <p:bg>
+      <p:bgPr>
+        <a:solidFill>
+          <a:schemeClr val="bg1"/>
+        </a:solidFill>
+        <a:effectLst/>
+      </p:bgPr>
+    </p:bg>
     <p:spTree>
       <p:nvGrpSpPr>
         <p:cNvPr id="1" name=""/>
@@ -17301,6 +17394,66 @@
           <a:chExt cx="0" cy="0"/>
         </a:xfrm>
       </p:grpSpPr>
+      <p:sp useBgFill="1">
+        <p:nvSpPr>
+          <p:cNvPr id="8" name="Rectangle 7">
+            <a:extLst>
+              <a:ext uri="{FF2B5EF4-FFF2-40B4-BE49-F238E27FC236}">
+                <a16:creationId xmlns:a16="http://schemas.microsoft.com/office/drawing/2014/main" id="{777A147A-9ED8-46B4-8660-1B3C2AA880B5}"/>
+              </a:ext>
+              <a:ext uri="{C183D7F6-B498-43B3-948B-1728B52AA6E4}">
+                <adec:decorative xmlns:adec="http://schemas.microsoft.com/office/drawing/2017/decorative" val="1"/>
+              </a:ext>
+            </a:extLst>
+          </p:cNvPr>
+          <p:cNvSpPr>
+            <a:spLocks noGrp="1" noRot="1" noChangeAspect="1" noMove="1" noResize="1" noEditPoints="1" noAdjustHandles="1" noChangeArrowheads="1" noChangeShapeType="1" noTextEdit="1"/>
+          </p:cNvSpPr>
+          <p:nvPr>
+            <p:extLst>
+              <p:ext uri="{386F3935-93C4-4BCD-93E2-E3B085C9AB24}">
+                <p16:designElem xmlns:p16="http://schemas.microsoft.com/office/powerpoint/2015/main" val="1"/>
+              </p:ext>
+            </p:extLst>
+          </p:nvPr>
+        </p:nvSpPr>
+        <p:spPr>
+          <a:xfrm>
+            <a:off x="0" y="0"/>
+            <a:ext cx="12188952" cy="6858000"/>
+          </a:xfrm>
+          <a:prstGeom prst="rect">
+            <a:avLst/>
+          </a:prstGeom>
+          <a:ln>
+            <a:noFill/>
+          </a:ln>
+        </p:spPr>
+        <p:style>
+          <a:lnRef idx="2">
+            <a:schemeClr val="accent1">
+              <a:shade val="50000"/>
+            </a:schemeClr>
+          </a:lnRef>
+          <a:fillRef idx="1">
+            <a:schemeClr val="accent1"/>
+          </a:fillRef>
+          <a:effectRef idx="0">
+            <a:schemeClr val="accent1"/>
+          </a:effectRef>
+          <a:fontRef idx="minor">
+            <a:schemeClr val="lt1"/>
+          </a:fontRef>
+        </p:style>
+        <p:txBody>
+          <a:bodyPr rtlCol="0" anchor="ctr"/>
+          <a:lstStyle/>
+          <a:p>
+            <a:pPr algn="ctr"/>
+            <a:endParaRPr lang="en-US"/>
+          </a:p>
+        </p:txBody>
+      </p:sp>
       <p:sp>
         <p:nvSpPr>
           <p:cNvPr id="2" name="Titel 1">
@@ -17317,15 +17470,365 @@
             <p:ph type="title"/>
           </p:nvPr>
         </p:nvSpPr>
-        <p:spPr/>
+        <p:spPr>
+          <a:xfrm>
+            <a:off x="841248" y="548640"/>
+            <a:ext cx="3600860" cy="5431536"/>
+          </a:xfrm>
+        </p:spPr>
         <p:txBody>
-          <a:bodyPr/>
+          <a:bodyPr>
+            <a:normAutofit/>
+          </a:bodyPr>
           <a:lstStyle/>
           <a:p>
             <a:r>
-              <a:rPr lang="de-DE" dirty="0"/>
+              <a:rPr lang="de-DE" sz="5400"/>
               <a:t>Quiz</a:t>
             </a:r>
+          </a:p>
+        </p:txBody>
+      </p:sp>
+      <p:sp>
+        <p:nvSpPr>
+          <p:cNvPr id="14" name="sketch line">
+            <a:extLst>
+              <a:ext uri="{FF2B5EF4-FFF2-40B4-BE49-F238E27FC236}">
+                <a16:creationId xmlns:a16="http://schemas.microsoft.com/office/drawing/2014/main" id="{5D6C15A0-C087-4593-8414-2B4EC1CDC3DE}"/>
+              </a:ext>
+              <a:ext uri="{C183D7F6-B498-43B3-948B-1728B52AA6E4}">
+                <adec:decorative xmlns:adec="http://schemas.microsoft.com/office/drawing/2017/decorative" val="1"/>
+              </a:ext>
+            </a:extLst>
+          </p:cNvPr>
+          <p:cNvSpPr>
+            <a:spLocks noGrp="1" noRot="1" noChangeAspect="1" noMove="1" noResize="1" noEditPoints="1" noAdjustHandles="1" noChangeArrowheads="1" noChangeShapeType="1" noTextEdit="1"/>
+          </p:cNvSpPr>
+          <p:nvPr>
+            <p:extLst>
+              <p:ext uri="{386F3935-93C4-4BCD-93E2-E3B085C9AB24}">
+                <p16:designElem xmlns:p16="http://schemas.microsoft.com/office/powerpoint/2015/main" val="1"/>
+              </p:ext>
+            </p:extLst>
+          </p:nvPr>
+        </p:nvSpPr>
+        <p:spPr>
+          <a:xfrm rot="5400000">
+            <a:off x="2543983" y="3258715"/>
+            <a:ext cx="4480560" cy="18288"/>
+          </a:xfrm>
+          <a:custGeom>
+            <a:avLst/>
+            <a:gdLst>
+              <a:gd name="connsiteX0" fmla="*/ 0 w 4480560"/>
+              <a:gd name="connsiteY0" fmla="*/ 0 h 18288"/>
+              <a:gd name="connsiteX1" fmla="*/ 595274 w 4480560"/>
+              <a:gd name="connsiteY1" fmla="*/ 0 h 18288"/>
+              <a:gd name="connsiteX2" fmla="*/ 1100938 w 4480560"/>
+              <a:gd name="connsiteY2" fmla="*/ 0 h 18288"/>
+              <a:gd name="connsiteX3" fmla="*/ 1651406 w 4480560"/>
+              <a:gd name="connsiteY3" fmla="*/ 0 h 18288"/>
+              <a:gd name="connsiteX4" fmla="*/ 2336292 w 4480560"/>
+              <a:gd name="connsiteY4" fmla="*/ 0 h 18288"/>
+              <a:gd name="connsiteX5" fmla="*/ 2931566 w 4480560"/>
+              <a:gd name="connsiteY5" fmla="*/ 0 h 18288"/>
+              <a:gd name="connsiteX6" fmla="*/ 3482035 w 4480560"/>
+              <a:gd name="connsiteY6" fmla="*/ 0 h 18288"/>
+              <a:gd name="connsiteX7" fmla="*/ 4480560 w 4480560"/>
+              <a:gd name="connsiteY7" fmla="*/ 0 h 18288"/>
+              <a:gd name="connsiteX8" fmla="*/ 4480560 w 4480560"/>
+              <a:gd name="connsiteY8" fmla="*/ 18288 h 18288"/>
+              <a:gd name="connsiteX9" fmla="*/ 3840480 w 4480560"/>
+              <a:gd name="connsiteY9" fmla="*/ 18288 h 18288"/>
+              <a:gd name="connsiteX10" fmla="*/ 3290011 w 4480560"/>
+              <a:gd name="connsiteY10" fmla="*/ 18288 h 18288"/>
+              <a:gd name="connsiteX11" fmla="*/ 2560320 w 4480560"/>
+              <a:gd name="connsiteY11" fmla="*/ 18288 h 18288"/>
+              <a:gd name="connsiteX12" fmla="*/ 1965046 w 4480560"/>
+              <a:gd name="connsiteY12" fmla="*/ 18288 h 18288"/>
+              <a:gd name="connsiteX13" fmla="*/ 1459382 w 4480560"/>
+              <a:gd name="connsiteY13" fmla="*/ 18288 h 18288"/>
+              <a:gd name="connsiteX14" fmla="*/ 774497 w 4480560"/>
+              <a:gd name="connsiteY14" fmla="*/ 18288 h 18288"/>
+              <a:gd name="connsiteX15" fmla="*/ 0 w 4480560"/>
+              <a:gd name="connsiteY15" fmla="*/ 18288 h 18288"/>
+              <a:gd name="connsiteX16" fmla="*/ 0 w 4480560"/>
+              <a:gd name="connsiteY16" fmla="*/ 0 h 18288"/>
+            </a:gdLst>
+            <a:ahLst/>
+            <a:cxnLst>
+              <a:cxn ang="0">
+                <a:pos x="connsiteX0" y="connsiteY0"/>
+              </a:cxn>
+              <a:cxn ang="0">
+                <a:pos x="connsiteX1" y="connsiteY1"/>
+              </a:cxn>
+              <a:cxn ang="0">
+                <a:pos x="connsiteX2" y="connsiteY2"/>
+              </a:cxn>
+              <a:cxn ang="0">
+                <a:pos x="connsiteX3" y="connsiteY3"/>
+              </a:cxn>
+              <a:cxn ang="0">
+                <a:pos x="connsiteX4" y="connsiteY4"/>
+              </a:cxn>
+              <a:cxn ang="0">
+                <a:pos x="connsiteX5" y="connsiteY5"/>
+              </a:cxn>
+              <a:cxn ang="0">
+                <a:pos x="connsiteX6" y="connsiteY6"/>
+              </a:cxn>
+              <a:cxn ang="0">
+                <a:pos x="connsiteX7" y="connsiteY7"/>
+              </a:cxn>
+              <a:cxn ang="0">
+                <a:pos x="connsiteX8" y="connsiteY8"/>
+              </a:cxn>
+              <a:cxn ang="0">
+                <a:pos x="connsiteX9" y="connsiteY9"/>
+              </a:cxn>
+              <a:cxn ang="0">
+                <a:pos x="connsiteX10" y="connsiteY10"/>
+              </a:cxn>
+              <a:cxn ang="0">
+                <a:pos x="connsiteX11" y="connsiteY11"/>
+              </a:cxn>
+              <a:cxn ang="0">
+                <a:pos x="connsiteX12" y="connsiteY12"/>
+              </a:cxn>
+              <a:cxn ang="0">
+                <a:pos x="connsiteX13" y="connsiteY13"/>
+              </a:cxn>
+              <a:cxn ang="0">
+                <a:pos x="connsiteX14" y="connsiteY14"/>
+              </a:cxn>
+              <a:cxn ang="0">
+                <a:pos x="connsiteX15" y="connsiteY15"/>
+              </a:cxn>
+              <a:cxn ang="0">
+                <a:pos x="connsiteX16" y="connsiteY16"/>
+              </a:cxn>
+            </a:cxnLst>
+            <a:rect l="l" t="t" r="r" b="b"/>
+            <a:pathLst>
+              <a:path w="4480560" h="18288" fill="none" extrusionOk="0">
+                <a:moveTo>
+                  <a:pt x="0" y="0"/>
+                </a:moveTo>
+                <a:cubicBezTo>
+                  <a:pt x="267821" y="8731"/>
+                  <a:pt x="334105" y="2629"/>
+                  <a:pt x="595274" y="0"/>
+                </a:cubicBezTo>
+                <a:cubicBezTo>
+                  <a:pt x="856443" y="-2629"/>
+                  <a:pt x="863808" y="-13353"/>
+                  <a:pt x="1100938" y="0"/>
+                </a:cubicBezTo>
+                <a:cubicBezTo>
+                  <a:pt x="1338068" y="13353"/>
+                  <a:pt x="1431663" y="-25862"/>
+                  <a:pt x="1651406" y="0"/>
+                </a:cubicBezTo>
+                <a:cubicBezTo>
+                  <a:pt x="1871149" y="25862"/>
+                  <a:pt x="2173163" y="23827"/>
+                  <a:pt x="2336292" y="0"/>
+                </a:cubicBezTo>
+                <a:cubicBezTo>
+                  <a:pt x="2499421" y="-23827"/>
+                  <a:pt x="2720589" y="28148"/>
+                  <a:pt x="2931566" y="0"/>
+                </a:cubicBezTo>
+                <a:cubicBezTo>
+                  <a:pt x="3142543" y="-28148"/>
+                  <a:pt x="3323630" y="27022"/>
+                  <a:pt x="3482035" y="0"/>
+                </a:cubicBezTo>
+                <a:cubicBezTo>
+                  <a:pt x="3640440" y="-27022"/>
+                  <a:pt x="4012110" y="-20118"/>
+                  <a:pt x="4480560" y="0"/>
+                </a:cubicBezTo>
+                <a:cubicBezTo>
+                  <a:pt x="4480958" y="7429"/>
+                  <a:pt x="4480540" y="10822"/>
+                  <a:pt x="4480560" y="18288"/>
+                </a:cubicBezTo>
+                <a:cubicBezTo>
+                  <a:pt x="4314132" y="14924"/>
+                  <a:pt x="4028383" y="36632"/>
+                  <a:pt x="3840480" y="18288"/>
+                </a:cubicBezTo>
+                <a:cubicBezTo>
+                  <a:pt x="3652577" y="-56"/>
+                  <a:pt x="3547615" y="2848"/>
+                  <a:pt x="3290011" y="18288"/>
+                </a:cubicBezTo>
+                <a:cubicBezTo>
+                  <a:pt x="3032407" y="33728"/>
+                  <a:pt x="2830268" y="8719"/>
+                  <a:pt x="2560320" y="18288"/>
+                </a:cubicBezTo>
+                <a:cubicBezTo>
+                  <a:pt x="2290372" y="27857"/>
+                  <a:pt x="2147422" y="6728"/>
+                  <a:pt x="1965046" y="18288"/>
+                </a:cubicBezTo>
+                <a:cubicBezTo>
+                  <a:pt x="1782670" y="29848"/>
+                  <a:pt x="1689791" y="40680"/>
+                  <a:pt x="1459382" y="18288"/>
+                </a:cubicBezTo>
+                <a:cubicBezTo>
+                  <a:pt x="1228973" y="-4104"/>
+                  <a:pt x="915486" y="36501"/>
+                  <a:pt x="774497" y="18288"/>
+                </a:cubicBezTo>
+                <a:cubicBezTo>
+                  <a:pt x="633508" y="75"/>
+                  <a:pt x="361442" y="-11107"/>
+                  <a:pt x="0" y="18288"/>
+                </a:cubicBezTo>
+                <a:cubicBezTo>
+                  <a:pt x="-591" y="13205"/>
+                  <a:pt x="-663" y="6329"/>
+                  <a:pt x="0" y="0"/>
+                </a:cubicBezTo>
+                <a:close/>
+              </a:path>
+              <a:path w="4480560" h="18288" stroke="0" extrusionOk="0">
+                <a:moveTo>
+                  <a:pt x="0" y="0"/>
+                </a:moveTo>
+                <a:cubicBezTo>
+                  <a:pt x="285465" y="225"/>
+                  <a:pt x="322691" y="16223"/>
+                  <a:pt x="595274" y="0"/>
+                </a:cubicBezTo>
+                <a:cubicBezTo>
+                  <a:pt x="867857" y="-16223"/>
+                  <a:pt x="989129" y="-11242"/>
+                  <a:pt x="1100938" y="0"/>
+                </a:cubicBezTo>
+                <a:cubicBezTo>
+                  <a:pt x="1212747" y="11242"/>
+                  <a:pt x="1574350" y="-36410"/>
+                  <a:pt x="1830629" y="0"/>
+                </a:cubicBezTo>
+                <a:cubicBezTo>
+                  <a:pt x="2086908" y="36410"/>
+                  <a:pt x="2180922" y="4645"/>
+                  <a:pt x="2425903" y="0"/>
+                </a:cubicBezTo>
+                <a:cubicBezTo>
+                  <a:pt x="2670884" y="-4645"/>
+                  <a:pt x="2782024" y="22929"/>
+                  <a:pt x="3021178" y="0"/>
+                </a:cubicBezTo>
+                <a:cubicBezTo>
+                  <a:pt x="3260332" y="-22929"/>
+                  <a:pt x="3456982" y="-1586"/>
+                  <a:pt x="3750869" y="0"/>
+                </a:cubicBezTo>
+                <a:cubicBezTo>
+                  <a:pt x="4044756" y="1586"/>
+                  <a:pt x="4302726" y="17043"/>
+                  <a:pt x="4480560" y="0"/>
+                </a:cubicBezTo>
+                <a:cubicBezTo>
+                  <a:pt x="4479674" y="5429"/>
+                  <a:pt x="4481381" y="14046"/>
+                  <a:pt x="4480560" y="18288"/>
+                </a:cubicBezTo>
+                <a:cubicBezTo>
+                  <a:pt x="4279652" y="-6850"/>
+                  <a:pt x="4200762" y="41566"/>
+                  <a:pt x="3930091" y="18288"/>
+                </a:cubicBezTo>
+                <a:cubicBezTo>
+                  <a:pt x="3659420" y="-4990"/>
+                  <a:pt x="3456052" y="22294"/>
+                  <a:pt x="3290011" y="18288"/>
+                </a:cubicBezTo>
+                <a:cubicBezTo>
+                  <a:pt x="3123970" y="14282"/>
+                  <a:pt x="2882392" y="32818"/>
+                  <a:pt x="2649931" y="18288"/>
+                </a:cubicBezTo>
+                <a:cubicBezTo>
+                  <a:pt x="2417470" y="3758"/>
+                  <a:pt x="2238426" y="7337"/>
+                  <a:pt x="2054657" y="18288"/>
+                </a:cubicBezTo>
+                <a:cubicBezTo>
+                  <a:pt x="1870888" y="29239"/>
+                  <a:pt x="1566368" y="45040"/>
+                  <a:pt x="1324966" y="18288"/>
+                </a:cubicBezTo>
+                <a:cubicBezTo>
+                  <a:pt x="1083564" y="-8464"/>
+                  <a:pt x="787410" y="10946"/>
+                  <a:pt x="595274" y="18288"/>
+                </a:cubicBezTo>
+                <a:cubicBezTo>
+                  <a:pt x="403138" y="25630"/>
+                  <a:pt x="169622" y="10499"/>
+                  <a:pt x="0" y="18288"/>
+                </a:cubicBezTo>
+                <a:cubicBezTo>
+                  <a:pt x="668" y="13665"/>
+                  <a:pt x="578" y="5675"/>
+                  <a:pt x="0" y="0"/>
+                </a:cubicBezTo>
+                <a:close/>
+              </a:path>
+            </a:pathLst>
+          </a:custGeom>
+          <a:solidFill>
+            <a:schemeClr val="accent2"/>
+          </a:solidFill>
+          <a:ln w="41275" cap="rnd">
+            <a:solidFill>
+              <a:schemeClr val="accent2"/>
+            </a:solidFill>
+            <a:round/>
+            <a:extLst>
+              <a:ext uri="{C807C97D-BFC1-408E-A445-0C87EB9F89A2}">
+                <ask:lineSketchStyleProps xmlns:ask="http://schemas.microsoft.com/office/drawing/2018/sketchyshapes" sd="1219033472">
+                  <a:prstGeom prst="rect">
+                    <a:avLst/>
+                  </a:prstGeom>
+                  <ask:type>
+                    <ask:lineSketchFreehand/>
+                  </ask:type>
+                </ask:lineSketchStyleProps>
+              </a:ext>
+            </a:extLst>
+          </a:ln>
+        </p:spPr>
+        <p:style>
+          <a:lnRef idx="2">
+            <a:schemeClr val="accent1">
+              <a:shade val="50000"/>
+            </a:schemeClr>
+          </a:lnRef>
+          <a:fillRef idx="1">
+            <a:schemeClr val="accent1"/>
+          </a:fillRef>
+          <a:effectRef idx="0">
+            <a:schemeClr val="accent1"/>
+          </a:effectRef>
+          <a:fontRef idx="minor">
+            <a:schemeClr val="lt1"/>
+          </a:fontRef>
+        </p:style>
+        <p:txBody>
+          <a:bodyPr rtlCol="0" anchor="ctr"/>
+          <a:lstStyle/>
+          <a:p>
+            <a:pPr algn="ctr"/>
+            <a:endParaRPr lang="en-US"/>
           </a:p>
         </p:txBody>
       </p:sp>
@@ -17345,97 +17848,56 @@
             <p:ph idx="1"/>
           </p:nvPr>
         </p:nvSpPr>
-        <p:spPr/>
+        <p:spPr>
+          <a:xfrm>
+            <a:off x="5126418" y="552091"/>
+            <a:ext cx="6224335" cy="5431536"/>
+          </a:xfrm>
+        </p:spPr>
         <p:txBody>
-          <a:bodyPr/>
+          <a:bodyPr anchor="ctr">
+            <a:normAutofit/>
+          </a:bodyPr>
           <a:lstStyle/>
           <a:p>
             <a:r>
-              <a:rPr lang="de-DE" dirty="0"/>
+              <a:rPr lang="de-DE" sz="2200"/>
               <a:t>Was ist eine Entität?</a:t>
             </a:r>
           </a:p>
           <a:p>
             <a:r>
-              <a:rPr lang="de-DE" dirty="0"/>
+              <a:rPr lang="de-DE" sz="2200"/>
               <a:t>Was ist ein BO?</a:t>
             </a:r>
           </a:p>
           <a:p>
             <a:r>
-              <a:rPr lang="de-DE" dirty="0"/>
-              <a:t>Was ist der Unterschied zwischen einer CDS-View mit „</a:t>
-            </a:r>
-            <a:r>
-              <a:rPr lang="de-DE" dirty="0" err="1"/>
-              <a:t>define</a:t>
-            </a:r>
-            <a:r>
-              <a:rPr lang="de-DE" dirty="0"/>
-              <a:t> </a:t>
-            </a:r>
-            <a:r>
-              <a:rPr lang="de-DE" dirty="0" err="1"/>
-              <a:t>view</a:t>
-            </a:r>
-            <a:r>
-              <a:rPr lang="de-DE" dirty="0"/>
-              <a:t>...“ und “</a:t>
-            </a:r>
-            <a:r>
-              <a:rPr lang="de-DE" dirty="0" err="1"/>
-              <a:t>define</a:t>
-            </a:r>
-            <a:r>
-              <a:rPr lang="de-DE" dirty="0"/>
-              <a:t> </a:t>
-            </a:r>
-            <a:r>
-              <a:rPr lang="de-DE" dirty="0" err="1"/>
-              <a:t>view</a:t>
-            </a:r>
-            <a:r>
-              <a:rPr lang="de-DE" dirty="0"/>
-              <a:t> </a:t>
-            </a:r>
-            <a:r>
-              <a:rPr lang="de-DE" dirty="0" err="1"/>
-              <a:t>entity</a:t>
-            </a:r>
-            <a:r>
-              <a:rPr lang="de-DE" dirty="0"/>
-              <a:t>...“.</a:t>
-            </a:r>
-          </a:p>
-          <a:p>
-            <a:r>
-              <a:rPr lang="de-DE" dirty="0"/>
-              <a:t>Was sind Assoziationen? Ziehe einen Vergleich zu einem herkömmlichen </a:t>
-            </a:r>
-            <a:r>
-              <a:rPr lang="de-DE" dirty="0" err="1"/>
-              <a:t>Join</a:t>
-            </a:r>
-            <a:r>
-              <a:rPr lang="de-DE" dirty="0"/>
-              <a:t>.</a:t>
-            </a:r>
-          </a:p>
-          <a:p>
-            <a:r>
-              <a:rPr lang="de-DE" dirty="0"/>
+              <a:rPr lang="de-DE" sz="2200"/>
+              <a:t>Was ist der Unterschied zwischen einer CDS-View mit „define view...“ und “define view entity...“.</a:t>
+            </a:r>
+          </a:p>
+          <a:p>
+            <a:r>
+              <a:rPr lang="de-DE" sz="2200"/>
+              <a:t>Was sind Assoziationen? Ziehe einen Vergleich zu einem herkömmlichen Join.</a:t>
+            </a:r>
+          </a:p>
+          <a:p>
+            <a:r>
+              <a:rPr lang="de-DE" sz="2200"/>
               <a:t>Wofür werden Kompositionen verwendet?</a:t>
             </a:r>
           </a:p>
           <a:p>
             <a:r>
-              <a:rPr lang="de-DE" dirty="0"/>
+              <a:rPr lang="de-DE" sz="2200"/>
               <a:t>Beschreibe den Grundaufbau einer CDS.</a:t>
             </a:r>
           </a:p>
           <a:p>
             <a:r>
-              <a:rPr lang="de-DE" dirty="0"/>
+              <a:rPr lang="de-DE" sz="2200"/>
               <a:t>Wozu dienen Annotationen?</a:t>
             </a:r>
           </a:p>
@@ -23692,6 +24154,928 @@
       </p:grpSpPr>
       <p:sp useBgFill="1">
         <p:nvSpPr>
+          <p:cNvPr id="8" name="Rectangle 7">
+            <a:extLst>
+              <a:ext uri="{FF2B5EF4-FFF2-40B4-BE49-F238E27FC236}">
+                <a16:creationId xmlns:a16="http://schemas.microsoft.com/office/drawing/2014/main" id="{777A147A-9ED8-46B4-8660-1B3C2AA880B5}"/>
+              </a:ext>
+              <a:ext uri="{C183D7F6-B498-43B3-948B-1728B52AA6E4}">
+                <adec:decorative xmlns:adec="http://schemas.microsoft.com/office/drawing/2017/decorative" val="1"/>
+              </a:ext>
+            </a:extLst>
+          </p:cNvPr>
+          <p:cNvSpPr>
+            <a:spLocks noGrp="1" noRot="1" noChangeAspect="1" noMove="1" noResize="1" noEditPoints="1" noAdjustHandles="1" noChangeArrowheads="1" noChangeShapeType="1" noTextEdit="1"/>
+          </p:cNvSpPr>
+          <p:nvPr>
+            <p:extLst>
+              <p:ext uri="{386F3935-93C4-4BCD-93E2-E3B085C9AB24}">
+                <p16:designElem xmlns:p16="http://schemas.microsoft.com/office/powerpoint/2015/main" val="1"/>
+              </p:ext>
+            </p:extLst>
+          </p:nvPr>
+        </p:nvSpPr>
+        <p:spPr>
+          <a:xfrm>
+            <a:off x="0" y="0"/>
+            <a:ext cx="12188952" cy="6858000"/>
+          </a:xfrm>
+          <a:prstGeom prst="rect">
+            <a:avLst/>
+          </a:prstGeom>
+          <a:ln>
+            <a:noFill/>
+          </a:ln>
+        </p:spPr>
+        <p:style>
+          <a:lnRef idx="2">
+            <a:schemeClr val="accent1">
+              <a:shade val="50000"/>
+            </a:schemeClr>
+          </a:lnRef>
+          <a:fillRef idx="1">
+            <a:schemeClr val="accent1"/>
+          </a:fillRef>
+          <a:effectRef idx="0">
+            <a:schemeClr val="accent1"/>
+          </a:effectRef>
+          <a:fontRef idx="minor">
+            <a:schemeClr val="lt1"/>
+          </a:fontRef>
+        </p:style>
+        <p:txBody>
+          <a:bodyPr rtlCol="0" anchor="ctr"/>
+          <a:lstStyle/>
+          <a:p>
+            <a:pPr algn="ctr"/>
+            <a:endParaRPr lang="en-US"/>
+          </a:p>
+        </p:txBody>
+      </p:sp>
+      <p:sp>
+        <p:nvSpPr>
+          <p:cNvPr id="2" name="Titel 1">
+            <a:extLst>
+              <a:ext uri="{FF2B5EF4-FFF2-40B4-BE49-F238E27FC236}">
+                <a16:creationId xmlns:a16="http://schemas.microsoft.com/office/drawing/2014/main" id="{C08D6C17-30FC-AEB8-1076-F0D28E8388AC}"/>
+              </a:ext>
+            </a:extLst>
+          </p:cNvPr>
+          <p:cNvSpPr>
+            <a:spLocks noGrp="1"/>
+          </p:cNvSpPr>
+          <p:nvPr>
+            <p:ph type="title"/>
+          </p:nvPr>
+        </p:nvSpPr>
+        <p:spPr>
+          <a:xfrm>
+            <a:off x="841248" y="548640"/>
+            <a:ext cx="3600860" cy="5431536"/>
+          </a:xfrm>
+        </p:spPr>
+        <p:txBody>
+          <a:bodyPr>
+            <a:normAutofit/>
+          </a:bodyPr>
+          <a:lstStyle/>
+          <a:p>
+            <a:r>
+              <a:rPr lang="de-DE" sz="5400"/>
+              <a:t>Hands On +</a:t>
+            </a:r>
+          </a:p>
+        </p:txBody>
+      </p:sp>
+      <p:sp>
+        <p:nvSpPr>
+          <p:cNvPr id="10" name="sketch line">
+            <a:extLst>
+              <a:ext uri="{FF2B5EF4-FFF2-40B4-BE49-F238E27FC236}">
+                <a16:creationId xmlns:a16="http://schemas.microsoft.com/office/drawing/2014/main" id="{5D6C15A0-C087-4593-8414-2B4EC1CDC3DE}"/>
+              </a:ext>
+              <a:ext uri="{C183D7F6-B498-43B3-948B-1728B52AA6E4}">
+                <adec:decorative xmlns:adec="http://schemas.microsoft.com/office/drawing/2017/decorative" val="1"/>
+              </a:ext>
+            </a:extLst>
+          </p:cNvPr>
+          <p:cNvSpPr>
+            <a:spLocks noGrp="1" noRot="1" noChangeAspect="1" noMove="1" noResize="1" noEditPoints="1" noAdjustHandles="1" noChangeArrowheads="1" noChangeShapeType="1" noTextEdit="1"/>
+          </p:cNvSpPr>
+          <p:nvPr>
+            <p:extLst>
+              <p:ext uri="{386F3935-93C4-4BCD-93E2-E3B085C9AB24}">
+                <p16:designElem xmlns:p16="http://schemas.microsoft.com/office/powerpoint/2015/main" val="1"/>
+              </p:ext>
+            </p:extLst>
+          </p:nvPr>
+        </p:nvSpPr>
+        <p:spPr>
+          <a:xfrm rot="5400000">
+            <a:off x="2543983" y="3258715"/>
+            <a:ext cx="4480560" cy="18288"/>
+          </a:xfrm>
+          <a:custGeom>
+            <a:avLst/>
+            <a:gdLst>
+              <a:gd name="connsiteX0" fmla="*/ 0 w 4480560"/>
+              <a:gd name="connsiteY0" fmla="*/ 0 h 18288"/>
+              <a:gd name="connsiteX1" fmla="*/ 595274 w 4480560"/>
+              <a:gd name="connsiteY1" fmla="*/ 0 h 18288"/>
+              <a:gd name="connsiteX2" fmla="*/ 1100938 w 4480560"/>
+              <a:gd name="connsiteY2" fmla="*/ 0 h 18288"/>
+              <a:gd name="connsiteX3" fmla="*/ 1651406 w 4480560"/>
+              <a:gd name="connsiteY3" fmla="*/ 0 h 18288"/>
+              <a:gd name="connsiteX4" fmla="*/ 2336292 w 4480560"/>
+              <a:gd name="connsiteY4" fmla="*/ 0 h 18288"/>
+              <a:gd name="connsiteX5" fmla="*/ 2931566 w 4480560"/>
+              <a:gd name="connsiteY5" fmla="*/ 0 h 18288"/>
+              <a:gd name="connsiteX6" fmla="*/ 3482035 w 4480560"/>
+              <a:gd name="connsiteY6" fmla="*/ 0 h 18288"/>
+              <a:gd name="connsiteX7" fmla="*/ 4480560 w 4480560"/>
+              <a:gd name="connsiteY7" fmla="*/ 0 h 18288"/>
+              <a:gd name="connsiteX8" fmla="*/ 4480560 w 4480560"/>
+              <a:gd name="connsiteY8" fmla="*/ 18288 h 18288"/>
+              <a:gd name="connsiteX9" fmla="*/ 3840480 w 4480560"/>
+              <a:gd name="connsiteY9" fmla="*/ 18288 h 18288"/>
+              <a:gd name="connsiteX10" fmla="*/ 3290011 w 4480560"/>
+              <a:gd name="connsiteY10" fmla="*/ 18288 h 18288"/>
+              <a:gd name="connsiteX11" fmla="*/ 2560320 w 4480560"/>
+              <a:gd name="connsiteY11" fmla="*/ 18288 h 18288"/>
+              <a:gd name="connsiteX12" fmla="*/ 1965046 w 4480560"/>
+              <a:gd name="connsiteY12" fmla="*/ 18288 h 18288"/>
+              <a:gd name="connsiteX13" fmla="*/ 1459382 w 4480560"/>
+              <a:gd name="connsiteY13" fmla="*/ 18288 h 18288"/>
+              <a:gd name="connsiteX14" fmla="*/ 774497 w 4480560"/>
+              <a:gd name="connsiteY14" fmla="*/ 18288 h 18288"/>
+              <a:gd name="connsiteX15" fmla="*/ 0 w 4480560"/>
+              <a:gd name="connsiteY15" fmla="*/ 18288 h 18288"/>
+              <a:gd name="connsiteX16" fmla="*/ 0 w 4480560"/>
+              <a:gd name="connsiteY16" fmla="*/ 0 h 18288"/>
+            </a:gdLst>
+            <a:ahLst/>
+            <a:cxnLst>
+              <a:cxn ang="0">
+                <a:pos x="connsiteX0" y="connsiteY0"/>
+              </a:cxn>
+              <a:cxn ang="0">
+                <a:pos x="connsiteX1" y="connsiteY1"/>
+              </a:cxn>
+              <a:cxn ang="0">
+                <a:pos x="connsiteX2" y="connsiteY2"/>
+              </a:cxn>
+              <a:cxn ang="0">
+                <a:pos x="connsiteX3" y="connsiteY3"/>
+              </a:cxn>
+              <a:cxn ang="0">
+                <a:pos x="connsiteX4" y="connsiteY4"/>
+              </a:cxn>
+              <a:cxn ang="0">
+                <a:pos x="connsiteX5" y="connsiteY5"/>
+              </a:cxn>
+              <a:cxn ang="0">
+                <a:pos x="connsiteX6" y="connsiteY6"/>
+              </a:cxn>
+              <a:cxn ang="0">
+                <a:pos x="connsiteX7" y="connsiteY7"/>
+              </a:cxn>
+              <a:cxn ang="0">
+                <a:pos x="connsiteX8" y="connsiteY8"/>
+              </a:cxn>
+              <a:cxn ang="0">
+                <a:pos x="connsiteX9" y="connsiteY9"/>
+              </a:cxn>
+              <a:cxn ang="0">
+                <a:pos x="connsiteX10" y="connsiteY10"/>
+              </a:cxn>
+              <a:cxn ang="0">
+                <a:pos x="connsiteX11" y="connsiteY11"/>
+              </a:cxn>
+              <a:cxn ang="0">
+                <a:pos x="connsiteX12" y="connsiteY12"/>
+              </a:cxn>
+              <a:cxn ang="0">
+                <a:pos x="connsiteX13" y="connsiteY13"/>
+              </a:cxn>
+              <a:cxn ang="0">
+                <a:pos x="connsiteX14" y="connsiteY14"/>
+              </a:cxn>
+              <a:cxn ang="0">
+                <a:pos x="connsiteX15" y="connsiteY15"/>
+              </a:cxn>
+              <a:cxn ang="0">
+                <a:pos x="connsiteX16" y="connsiteY16"/>
+              </a:cxn>
+            </a:cxnLst>
+            <a:rect l="l" t="t" r="r" b="b"/>
+            <a:pathLst>
+              <a:path w="4480560" h="18288" fill="none" extrusionOk="0">
+                <a:moveTo>
+                  <a:pt x="0" y="0"/>
+                </a:moveTo>
+                <a:cubicBezTo>
+                  <a:pt x="267821" y="8731"/>
+                  <a:pt x="334105" y="2629"/>
+                  <a:pt x="595274" y="0"/>
+                </a:cubicBezTo>
+                <a:cubicBezTo>
+                  <a:pt x="856443" y="-2629"/>
+                  <a:pt x="863808" y="-13353"/>
+                  <a:pt x="1100938" y="0"/>
+                </a:cubicBezTo>
+                <a:cubicBezTo>
+                  <a:pt x="1338068" y="13353"/>
+                  <a:pt x="1431663" y="-25862"/>
+                  <a:pt x="1651406" y="0"/>
+                </a:cubicBezTo>
+                <a:cubicBezTo>
+                  <a:pt x="1871149" y="25862"/>
+                  <a:pt x="2173163" y="23827"/>
+                  <a:pt x="2336292" y="0"/>
+                </a:cubicBezTo>
+                <a:cubicBezTo>
+                  <a:pt x="2499421" y="-23827"/>
+                  <a:pt x="2720589" y="28148"/>
+                  <a:pt x="2931566" y="0"/>
+                </a:cubicBezTo>
+                <a:cubicBezTo>
+                  <a:pt x="3142543" y="-28148"/>
+                  <a:pt x="3323630" y="27022"/>
+                  <a:pt x="3482035" y="0"/>
+                </a:cubicBezTo>
+                <a:cubicBezTo>
+                  <a:pt x="3640440" y="-27022"/>
+                  <a:pt x="4012110" y="-20118"/>
+                  <a:pt x="4480560" y="0"/>
+                </a:cubicBezTo>
+                <a:cubicBezTo>
+                  <a:pt x="4480958" y="7429"/>
+                  <a:pt x="4480540" y="10822"/>
+                  <a:pt x="4480560" y="18288"/>
+                </a:cubicBezTo>
+                <a:cubicBezTo>
+                  <a:pt x="4314132" y="14924"/>
+                  <a:pt x="4028383" y="36632"/>
+                  <a:pt x="3840480" y="18288"/>
+                </a:cubicBezTo>
+                <a:cubicBezTo>
+                  <a:pt x="3652577" y="-56"/>
+                  <a:pt x="3547615" y="2848"/>
+                  <a:pt x="3290011" y="18288"/>
+                </a:cubicBezTo>
+                <a:cubicBezTo>
+                  <a:pt x="3032407" y="33728"/>
+                  <a:pt x="2830268" y="8719"/>
+                  <a:pt x="2560320" y="18288"/>
+                </a:cubicBezTo>
+                <a:cubicBezTo>
+                  <a:pt x="2290372" y="27857"/>
+                  <a:pt x="2147422" y="6728"/>
+                  <a:pt x="1965046" y="18288"/>
+                </a:cubicBezTo>
+                <a:cubicBezTo>
+                  <a:pt x="1782670" y="29848"/>
+                  <a:pt x="1689791" y="40680"/>
+                  <a:pt x="1459382" y="18288"/>
+                </a:cubicBezTo>
+                <a:cubicBezTo>
+                  <a:pt x="1228973" y="-4104"/>
+                  <a:pt x="915486" y="36501"/>
+                  <a:pt x="774497" y="18288"/>
+                </a:cubicBezTo>
+                <a:cubicBezTo>
+                  <a:pt x="633508" y="75"/>
+                  <a:pt x="361442" y="-11107"/>
+                  <a:pt x="0" y="18288"/>
+                </a:cubicBezTo>
+                <a:cubicBezTo>
+                  <a:pt x="-591" y="13205"/>
+                  <a:pt x="-663" y="6329"/>
+                  <a:pt x="0" y="0"/>
+                </a:cubicBezTo>
+                <a:close/>
+              </a:path>
+              <a:path w="4480560" h="18288" stroke="0" extrusionOk="0">
+                <a:moveTo>
+                  <a:pt x="0" y="0"/>
+                </a:moveTo>
+                <a:cubicBezTo>
+                  <a:pt x="285465" y="225"/>
+                  <a:pt x="322691" y="16223"/>
+                  <a:pt x="595274" y="0"/>
+                </a:cubicBezTo>
+                <a:cubicBezTo>
+                  <a:pt x="867857" y="-16223"/>
+                  <a:pt x="989129" y="-11242"/>
+                  <a:pt x="1100938" y="0"/>
+                </a:cubicBezTo>
+                <a:cubicBezTo>
+                  <a:pt x="1212747" y="11242"/>
+                  <a:pt x="1574350" y="-36410"/>
+                  <a:pt x="1830629" y="0"/>
+                </a:cubicBezTo>
+                <a:cubicBezTo>
+                  <a:pt x="2086908" y="36410"/>
+                  <a:pt x="2180922" y="4645"/>
+                  <a:pt x="2425903" y="0"/>
+                </a:cubicBezTo>
+                <a:cubicBezTo>
+                  <a:pt x="2670884" y="-4645"/>
+                  <a:pt x="2782024" y="22929"/>
+                  <a:pt x="3021178" y="0"/>
+                </a:cubicBezTo>
+                <a:cubicBezTo>
+                  <a:pt x="3260332" y="-22929"/>
+                  <a:pt x="3456982" y="-1586"/>
+                  <a:pt x="3750869" y="0"/>
+                </a:cubicBezTo>
+                <a:cubicBezTo>
+                  <a:pt x="4044756" y="1586"/>
+                  <a:pt x="4302726" y="17043"/>
+                  <a:pt x="4480560" y="0"/>
+                </a:cubicBezTo>
+                <a:cubicBezTo>
+                  <a:pt x="4479674" y="5429"/>
+                  <a:pt x="4481381" y="14046"/>
+                  <a:pt x="4480560" y="18288"/>
+                </a:cubicBezTo>
+                <a:cubicBezTo>
+                  <a:pt x="4279652" y="-6850"/>
+                  <a:pt x="4200762" y="41566"/>
+                  <a:pt x="3930091" y="18288"/>
+                </a:cubicBezTo>
+                <a:cubicBezTo>
+                  <a:pt x="3659420" y="-4990"/>
+                  <a:pt x="3456052" y="22294"/>
+                  <a:pt x="3290011" y="18288"/>
+                </a:cubicBezTo>
+                <a:cubicBezTo>
+                  <a:pt x="3123970" y="14282"/>
+                  <a:pt x="2882392" y="32818"/>
+                  <a:pt x="2649931" y="18288"/>
+                </a:cubicBezTo>
+                <a:cubicBezTo>
+                  <a:pt x="2417470" y="3758"/>
+                  <a:pt x="2238426" y="7337"/>
+                  <a:pt x="2054657" y="18288"/>
+                </a:cubicBezTo>
+                <a:cubicBezTo>
+                  <a:pt x="1870888" y="29239"/>
+                  <a:pt x="1566368" y="45040"/>
+                  <a:pt x="1324966" y="18288"/>
+                </a:cubicBezTo>
+                <a:cubicBezTo>
+                  <a:pt x="1083564" y="-8464"/>
+                  <a:pt x="787410" y="10946"/>
+                  <a:pt x="595274" y="18288"/>
+                </a:cubicBezTo>
+                <a:cubicBezTo>
+                  <a:pt x="403138" y="25630"/>
+                  <a:pt x="169622" y="10499"/>
+                  <a:pt x="0" y="18288"/>
+                </a:cubicBezTo>
+                <a:cubicBezTo>
+                  <a:pt x="668" y="13665"/>
+                  <a:pt x="578" y="5675"/>
+                  <a:pt x="0" y="0"/>
+                </a:cubicBezTo>
+                <a:close/>
+              </a:path>
+            </a:pathLst>
+          </a:custGeom>
+          <a:solidFill>
+            <a:schemeClr val="accent2"/>
+          </a:solidFill>
+          <a:ln w="41275" cap="rnd">
+            <a:solidFill>
+              <a:schemeClr val="accent2"/>
+            </a:solidFill>
+            <a:round/>
+            <a:extLst>
+              <a:ext uri="{C807C97D-BFC1-408E-A445-0C87EB9F89A2}">
+                <ask:lineSketchStyleProps xmlns:ask="http://schemas.microsoft.com/office/drawing/2018/sketchyshapes" sd="1219033472">
+                  <a:prstGeom prst="rect">
+                    <a:avLst/>
+                  </a:prstGeom>
+                  <ask:type>
+                    <ask:lineSketchFreehand/>
+                  </ask:type>
+                </ask:lineSketchStyleProps>
+              </a:ext>
+            </a:extLst>
+          </a:ln>
+        </p:spPr>
+        <p:style>
+          <a:lnRef idx="2">
+            <a:schemeClr val="accent1">
+              <a:shade val="50000"/>
+            </a:schemeClr>
+          </a:lnRef>
+          <a:fillRef idx="1">
+            <a:schemeClr val="accent1"/>
+          </a:fillRef>
+          <a:effectRef idx="0">
+            <a:schemeClr val="accent1"/>
+          </a:effectRef>
+          <a:fontRef idx="minor">
+            <a:schemeClr val="lt1"/>
+          </a:fontRef>
+        </p:style>
+        <p:txBody>
+          <a:bodyPr rtlCol="0" anchor="ctr"/>
+          <a:lstStyle/>
+          <a:p>
+            <a:pPr algn="ctr"/>
+            <a:endParaRPr lang="en-US"/>
+          </a:p>
+        </p:txBody>
+      </p:sp>
+      <p:sp>
+        <p:nvSpPr>
+          <p:cNvPr id="3" name="Inhaltsplatzhalter 2">
+            <a:extLst>
+              <a:ext uri="{FF2B5EF4-FFF2-40B4-BE49-F238E27FC236}">
+                <a16:creationId xmlns:a16="http://schemas.microsoft.com/office/drawing/2014/main" id="{4A220151-7E3B-43EC-A37C-7E50B5B051F6}"/>
+              </a:ext>
+            </a:extLst>
+          </p:cNvPr>
+          <p:cNvSpPr>
+            <a:spLocks noGrp="1"/>
+          </p:cNvSpPr>
+          <p:nvPr>
+            <p:ph idx="1"/>
+          </p:nvPr>
+        </p:nvSpPr>
+        <p:spPr>
+          <a:xfrm>
+            <a:off x="5126418" y="552091"/>
+            <a:ext cx="6224335" cy="5431536"/>
+          </a:xfrm>
+        </p:spPr>
+        <p:txBody>
+          <a:bodyPr anchor="ctr">
+            <a:normAutofit/>
+          </a:bodyPr>
+          <a:lstStyle/>
+          <a:p>
+            <a:r>
+              <a:rPr lang="de-DE" sz="2200" dirty="0"/>
+              <a:t>Öffne ZC_SalesOrderWitthUserInput2</a:t>
+            </a:r>
+          </a:p>
+          <a:p>
+            <a:r>
+              <a:rPr lang="de-DE" sz="2200" dirty="0"/>
+              <a:t>Was passiert wenn ich folgenden Select machen würde:</a:t>
+            </a:r>
+            <a:br>
+              <a:rPr lang="de-DE" sz="2200" dirty="0"/>
+            </a:br>
+            <a:r>
+              <a:rPr lang="de-DE" sz="2200" dirty="0">
+                <a:latin typeface="Courier New" panose="02070309020205020404" pitchFamily="49" charset="0"/>
+                <a:cs typeface="Courier New" panose="02070309020205020404" pitchFamily="49" charset="0"/>
+              </a:rPr>
+              <a:t>SELECT * FROM zc_salesorderwithuserinput2( </a:t>
+            </a:r>
+            <a:r>
+              <a:rPr lang="de-DE" sz="2200" dirty="0" err="1">
+                <a:latin typeface="Courier New" panose="02070309020205020404" pitchFamily="49" charset="0"/>
+                <a:cs typeface="Courier New" panose="02070309020205020404" pitchFamily="49" charset="0"/>
+              </a:rPr>
+              <a:t>p_userinput</a:t>
+            </a:r>
+            <a:r>
+              <a:rPr lang="de-DE" sz="2200" dirty="0">
+                <a:latin typeface="Courier New" panose="02070309020205020404" pitchFamily="49" charset="0"/>
+                <a:cs typeface="Courier New" panose="02070309020205020404" pitchFamily="49" charset="0"/>
+              </a:rPr>
+              <a:t> = ‘TAF‘ ) INTO TABLE ... .</a:t>
+            </a:r>
+          </a:p>
+        </p:txBody>
+      </p:sp>
+    </p:spTree>
+    <p:extLst>
+      <p:ext uri="{BB962C8B-B14F-4D97-AF65-F5344CB8AC3E}">
+        <p14:creationId xmlns:p14="http://schemas.microsoft.com/office/powerpoint/2010/main" val="2065162720"/>
+      </p:ext>
+    </p:extLst>
+  </p:cSld>
+  <p:clrMapOvr>
+    <a:masterClrMapping/>
+  </p:clrMapOvr>
+</p:sld>
+</file>
+
+<file path=ppt/slides/slide4.xml><?xml version="1.0" encoding="utf-8"?>
+<p:sld xmlns:a="http://schemas.openxmlformats.org/drawingml/2006/main" xmlns:r="http://schemas.openxmlformats.org/officeDocument/2006/relationships" xmlns:p="http://schemas.openxmlformats.org/presentationml/2006/main">
+  <p:cSld>
+    <p:bg>
+      <p:bgPr>
+        <a:solidFill>
+          <a:schemeClr val="bg1"/>
+        </a:solidFill>
+        <a:effectLst/>
+      </p:bgPr>
+    </p:bg>
+    <p:spTree>
+      <p:nvGrpSpPr>
+        <p:cNvPr id="1" name=""/>
+        <p:cNvGrpSpPr/>
+        <p:nvPr/>
+      </p:nvGrpSpPr>
+      <p:grpSpPr>
+        <a:xfrm>
+          <a:off x="0" y="0"/>
+          <a:ext cx="0" cy="0"/>
+          <a:chOff x="0" y="0"/>
+          <a:chExt cx="0" cy="0"/>
+        </a:xfrm>
+      </p:grpSpPr>
+      <p:sp useBgFill="1">
+        <p:nvSpPr>
+          <p:cNvPr id="19" name="Rectangle 18">
+            <a:extLst>
+              <a:ext uri="{FF2B5EF4-FFF2-40B4-BE49-F238E27FC236}">
+                <a16:creationId xmlns:a16="http://schemas.microsoft.com/office/drawing/2014/main" id="{907EF6B7-1338-4443-8C46-6A318D952DFD}"/>
+              </a:ext>
+              <a:ext uri="{C183D7F6-B498-43B3-948B-1728B52AA6E4}">
+                <adec:decorative xmlns:adec="http://schemas.microsoft.com/office/drawing/2017/decorative" val="1"/>
+              </a:ext>
+            </a:extLst>
+          </p:cNvPr>
+          <p:cNvSpPr>
+            <a:spLocks noGrp="1" noRot="1" noChangeAspect="1" noMove="1" noResize="1" noEditPoints="1" noAdjustHandles="1" noChangeArrowheads="1" noChangeShapeType="1" noTextEdit="1"/>
+          </p:cNvSpPr>
+          <p:nvPr>
+            <p:extLst>
+              <p:ext uri="{386F3935-93C4-4BCD-93E2-E3B085C9AB24}">
+                <p16:designElem xmlns:p16="http://schemas.microsoft.com/office/powerpoint/2015/main" val="1"/>
+              </p:ext>
+            </p:extLst>
+          </p:nvPr>
+        </p:nvSpPr>
+        <p:spPr>
+          <a:xfrm>
+            <a:off x="3048" y="0"/>
+            <a:ext cx="12188952" cy="6858000"/>
+          </a:xfrm>
+          <a:prstGeom prst="rect">
+            <a:avLst/>
+          </a:prstGeom>
+          <a:ln>
+            <a:noFill/>
+          </a:ln>
+        </p:spPr>
+        <p:style>
+          <a:lnRef idx="2">
+            <a:schemeClr val="accent1">
+              <a:shade val="50000"/>
+            </a:schemeClr>
+          </a:lnRef>
+          <a:fillRef idx="1">
+            <a:schemeClr val="accent1"/>
+          </a:fillRef>
+          <a:effectRef idx="0">
+            <a:schemeClr val="accent1"/>
+          </a:effectRef>
+          <a:fontRef idx="minor">
+            <a:schemeClr val="lt1"/>
+          </a:fontRef>
+        </p:style>
+        <p:txBody>
+          <a:bodyPr rtlCol="0" anchor="ctr"/>
+          <a:lstStyle/>
+          <a:p>
+            <a:pPr algn="ctr"/>
+            <a:endParaRPr lang="en-US"/>
+          </a:p>
+        </p:txBody>
+      </p:sp>
+      <p:sp>
+        <p:nvSpPr>
+          <p:cNvPr id="21" name="Freeform: Shape 20">
+            <a:extLst>
+              <a:ext uri="{FF2B5EF4-FFF2-40B4-BE49-F238E27FC236}">
+                <a16:creationId xmlns:a16="http://schemas.microsoft.com/office/drawing/2014/main" id="{DAAE4CDD-124C-4DCF-9584-B6033B545DD5}"/>
+              </a:ext>
+              <a:ext uri="{C183D7F6-B498-43B3-948B-1728B52AA6E4}">
+                <adec:decorative xmlns:adec="http://schemas.microsoft.com/office/drawing/2017/decorative" val="1"/>
+              </a:ext>
+            </a:extLst>
+          </p:cNvPr>
+          <p:cNvSpPr>
+            <a:spLocks noGrp="1" noRot="1" noChangeAspect="1" noMove="1" noResize="1" noEditPoints="1" noAdjustHandles="1" noChangeArrowheads="1" noChangeShapeType="1" noTextEdit="1"/>
+          </p:cNvSpPr>
+          <p:nvPr>
+            <p:extLst>
+              <p:ext uri="{386F3935-93C4-4BCD-93E2-E3B085C9AB24}">
+                <p16:designElem xmlns:p16="http://schemas.microsoft.com/office/powerpoint/2015/main" val="1"/>
+              </p:ext>
+            </p:extLst>
+          </p:nvPr>
+        </p:nvSpPr>
+        <p:spPr>
+          <a:xfrm>
+            <a:off x="1" y="0"/>
+            <a:ext cx="4167271" cy="6858000"/>
+          </a:xfrm>
+          <a:custGeom>
+            <a:avLst/>
+            <a:gdLst>
+              <a:gd name="connsiteX0" fmla="*/ 0 w 4167271"/>
+              <a:gd name="connsiteY0" fmla="*/ 0 h 6858000"/>
+              <a:gd name="connsiteX1" fmla="*/ 2259550 w 4167271"/>
+              <a:gd name="connsiteY1" fmla="*/ 0 h 6858000"/>
+              <a:gd name="connsiteX2" fmla="*/ 2387803 w 4167271"/>
+              <a:gd name="connsiteY2" fmla="*/ 82222 h 6858000"/>
+              <a:gd name="connsiteX3" fmla="*/ 4167271 w 4167271"/>
+              <a:gd name="connsiteY3" fmla="*/ 3429000 h 6858000"/>
+              <a:gd name="connsiteX4" fmla="*/ 2387803 w 4167271"/>
+              <a:gd name="connsiteY4" fmla="*/ 6775779 h 6858000"/>
+              <a:gd name="connsiteX5" fmla="*/ 2259550 w 4167271"/>
+              <a:gd name="connsiteY5" fmla="*/ 6858000 h 6858000"/>
+              <a:gd name="connsiteX6" fmla="*/ 0 w 4167271"/>
+              <a:gd name="connsiteY6" fmla="*/ 6858000 h 6858000"/>
+            </a:gdLst>
+            <a:ahLst/>
+            <a:cxnLst>
+              <a:cxn ang="0">
+                <a:pos x="connsiteX0" y="connsiteY0"/>
+              </a:cxn>
+              <a:cxn ang="0">
+                <a:pos x="connsiteX1" y="connsiteY1"/>
+              </a:cxn>
+              <a:cxn ang="0">
+                <a:pos x="connsiteX2" y="connsiteY2"/>
+              </a:cxn>
+              <a:cxn ang="0">
+                <a:pos x="connsiteX3" y="connsiteY3"/>
+              </a:cxn>
+              <a:cxn ang="0">
+                <a:pos x="connsiteX4" y="connsiteY4"/>
+              </a:cxn>
+              <a:cxn ang="0">
+                <a:pos x="connsiteX5" y="connsiteY5"/>
+              </a:cxn>
+              <a:cxn ang="0">
+                <a:pos x="connsiteX6" y="connsiteY6"/>
+              </a:cxn>
+            </a:cxnLst>
+            <a:rect l="l" t="t" r="r" b="b"/>
+            <a:pathLst>
+              <a:path w="4167271" h="6858000">
+                <a:moveTo>
+                  <a:pt x="0" y="0"/>
+                </a:moveTo>
+                <a:lnTo>
+                  <a:pt x="2259550" y="0"/>
+                </a:lnTo>
+                <a:lnTo>
+                  <a:pt x="2387803" y="82222"/>
+                </a:lnTo>
+                <a:cubicBezTo>
+                  <a:pt x="3461407" y="807534"/>
+                  <a:pt x="4167271" y="2035835"/>
+                  <a:pt x="4167271" y="3429000"/>
+                </a:cubicBezTo>
+                <a:cubicBezTo>
+                  <a:pt x="4167271" y="4822165"/>
+                  <a:pt x="3461407" y="6050467"/>
+                  <a:pt x="2387803" y="6775779"/>
+                </a:cubicBezTo>
+                <a:lnTo>
+                  <a:pt x="2259550" y="6858000"/>
+                </a:lnTo>
+                <a:lnTo>
+                  <a:pt x="0" y="6858000"/>
+                </a:lnTo>
+                <a:close/>
+              </a:path>
+            </a:pathLst>
+          </a:custGeom>
+          <a:solidFill>
+            <a:schemeClr val="accent2"/>
+          </a:solidFill>
+          <a:ln>
+            <a:noFill/>
+          </a:ln>
+        </p:spPr>
+        <p:style>
+          <a:lnRef idx="2">
+            <a:schemeClr val="accent1">
+              <a:shade val="50000"/>
+            </a:schemeClr>
+          </a:lnRef>
+          <a:fillRef idx="1">
+            <a:schemeClr val="accent1"/>
+          </a:fillRef>
+          <a:effectRef idx="0">
+            <a:schemeClr val="accent1"/>
+          </a:effectRef>
+          <a:fontRef idx="minor">
+            <a:schemeClr val="lt1"/>
+          </a:fontRef>
+        </p:style>
+        <p:txBody>
+          <a:bodyPr rtlCol="0" anchor="ctr"/>
+          <a:lstStyle/>
+          <a:p>
+            <a:pPr algn="ctr"/>
+            <a:endParaRPr lang="en-US"/>
+          </a:p>
+        </p:txBody>
+      </p:sp>
+      <p:sp>
+        <p:nvSpPr>
+          <p:cNvPr id="2" name="Titel 1">
+            <a:extLst>
+              <a:ext uri="{FF2B5EF4-FFF2-40B4-BE49-F238E27FC236}">
+                <a16:creationId xmlns:a16="http://schemas.microsoft.com/office/drawing/2014/main" id="{92493E2E-0D32-3F0C-9FF0-3475F04C2619}"/>
+              </a:ext>
+            </a:extLst>
+          </p:cNvPr>
+          <p:cNvSpPr>
+            <a:spLocks noGrp="1"/>
+          </p:cNvSpPr>
+          <p:nvPr>
+            <p:ph type="title"/>
+          </p:nvPr>
+        </p:nvSpPr>
+        <p:spPr>
+          <a:xfrm>
+            <a:off x="686834" y="1153572"/>
+            <a:ext cx="3200400" cy="4461163"/>
+          </a:xfrm>
+        </p:spPr>
+        <p:txBody>
+          <a:bodyPr>
+            <a:normAutofit/>
+          </a:bodyPr>
+          <a:lstStyle/>
+          <a:p>
+            <a:r>
+              <a:rPr lang="de-DE">
+                <a:solidFill>
+                  <a:srgbClr val="FFFFFF"/>
+                </a:solidFill>
+              </a:rPr>
+              <a:t>Entität</a:t>
+            </a:r>
+          </a:p>
+        </p:txBody>
+      </p:sp>
+      <p:sp>
+        <p:nvSpPr>
+          <p:cNvPr id="23" name="Arc 22">
+            <a:extLst>
+              <a:ext uri="{FF2B5EF4-FFF2-40B4-BE49-F238E27FC236}">
+                <a16:creationId xmlns:a16="http://schemas.microsoft.com/office/drawing/2014/main" id="{081E4A58-353D-44AE-B2FC-2A74E2E400F7}"/>
+              </a:ext>
+              <a:ext uri="{C183D7F6-B498-43B3-948B-1728B52AA6E4}">
+                <adec:decorative xmlns:adec="http://schemas.microsoft.com/office/drawing/2017/decorative" val="1"/>
+              </a:ext>
+            </a:extLst>
+          </p:cNvPr>
+          <p:cNvSpPr>
+            <a:spLocks noGrp="1" noRot="1" noChangeAspect="1" noMove="1" noResize="1" noEditPoints="1" noAdjustHandles="1" noChangeArrowheads="1" noChangeShapeType="1" noTextEdit="1"/>
+          </p:cNvSpPr>
+          <p:nvPr>
+            <p:extLst>
+              <p:ext uri="{386F3935-93C4-4BCD-93E2-E3B085C9AB24}">
+                <p16:designElem xmlns:p16="http://schemas.microsoft.com/office/powerpoint/2015/main" val="1"/>
+              </p:ext>
+            </p:extLst>
+          </p:nvPr>
+        </p:nvSpPr>
+        <p:spPr>
+          <a:xfrm flipV="1">
+            <a:off x="7550402" y="2455479"/>
+            <a:ext cx="4083433" cy="4083433"/>
+          </a:xfrm>
+          <a:prstGeom prst="arc">
+            <a:avLst/>
+          </a:prstGeom>
+          <a:ln w="127000" cap="rnd">
+            <a:solidFill>
+              <a:schemeClr val="accent4"/>
+            </a:solidFill>
+            <a:prstDash val="dash"/>
+          </a:ln>
+        </p:spPr>
+        <p:style>
+          <a:lnRef idx="1">
+            <a:schemeClr val="accent1"/>
+          </a:lnRef>
+          <a:fillRef idx="0">
+            <a:schemeClr val="accent1"/>
+          </a:fillRef>
+          <a:effectRef idx="0">
+            <a:schemeClr val="accent1"/>
+          </a:effectRef>
+          <a:fontRef idx="minor">
+            <a:schemeClr val="tx1"/>
+          </a:fontRef>
+        </p:style>
+        <p:txBody>
+          <a:bodyPr rtlCol="0" anchor="ctr"/>
+          <a:lstStyle/>
+          <a:p>
+            <a:pPr algn="ctr"/>
+            <a:endParaRPr lang="en-US" dirty="0"/>
+          </a:p>
+        </p:txBody>
+      </p:sp>
+      <p:sp>
+        <p:nvSpPr>
+          <p:cNvPr id="3" name="Inhaltsplatzhalter 2">
+            <a:extLst>
+              <a:ext uri="{FF2B5EF4-FFF2-40B4-BE49-F238E27FC236}">
+                <a16:creationId xmlns:a16="http://schemas.microsoft.com/office/drawing/2014/main" id="{C11C5233-96BA-B1DB-ACF2-0B9B4483FE94}"/>
+              </a:ext>
+            </a:extLst>
+          </p:cNvPr>
+          <p:cNvSpPr>
+            <a:spLocks noGrp="1"/>
+          </p:cNvSpPr>
+          <p:nvPr>
+            <p:ph idx="1"/>
+          </p:nvPr>
+        </p:nvSpPr>
+        <p:spPr>
+          <a:xfrm>
+            <a:off x="4447308" y="591344"/>
+            <a:ext cx="6906491" cy="5585619"/>
+          </a:xfrm>
+        </p:spPr>
+        <p:txBody>
+          <a:bodyPr anchor="ctr">
+            <a:normAutofit/>
+          </a:bodyPr>
+          <a:lstStyle/>
+          <a:p>
+            <a:r>
+              <a:rPr lang="de-DE" dirty="0"/>
+              <a:t>Als Entität (englisch </a:t>
+            </a:r>
+            <a:r>
+              <a:rPr lang="de-DE" dirty="0" err="1"/>
+              <a:t>entity</a:t>
+            </a:r>
+            <a:r>
+              <a:rPr lang="de-DE" dirty="0"/>
+              <a:t>) wird in der Datenmodellierung ein eindeutig zu bestimmendes Objekt bezeichnet, über das Informationen gespeichert oder verarbeitet werden sollen.</a:t>
+            </a:r>
+          </a:p>
+          <a:p>
+            <a:r>
+              <a:rPr lang="de-DE" dirty="0"/>
+              <a:t>Beispiele: Ein Fahrzeug, ein Konto, eine Person, ein Zustand.</a:t>
+            </a:r>
+          </a:p>
+        </p:txBody>
+      </p:sp>
+    </p:spTree>
+    <p:extLst>
+      <p:ext uri="{BB962C8B-B14F-4D97-AF65-F5344CB8AC3E}">
+        <p14:creationId xmlns:p14="http://schemas.microsoft.com/office/powerpoint/2010/main" val="1553540450"/>
+      </p:ext>
+    </p:extLst>
+  </p:cSld>
+  <p:clrMapOvr>
+    <a:masterClrMapping/>
+  </p:clrMapOvr>
+</p:sld>
+</file>
+
+<file path=ppt/slides/slide40.xml><?xml version="1.0" encoding="utf-8"?>
+<p:sld xmlns:a="http://schemas.openxmlformats.org/drawingml/2006/main" xmlns:r="http://schemas.openxmlformats.org/officeDocument/2006/relationships" xmlns:p="http://schemas.openxmlformats.org/presentationml/2006/main">
+  <p:cSld>
+    <p:bg>
+      <p:bgPr>
+        <a:solidFill>
+          <a:schemeClr val="bg1"/>
+        </a:solidFill>
+        <a:effectLst/>
+      </p:bgPr>
+    </p:bg>
+    <p:spTree>
+      <p:nvGrpSpPr>
+        <p:cNvPr id="1" name=""/>
+        <p:cNvGrpSpPr/>
+        <p:nvPr/>
+      </p:nvGrpSpPr>
+      <p:grpSpPr>
+        <a:xfrm>
+          <a:off x="0" y="0"/>
+          <a:ext cx="0" cy="0"/>
+          <a:chOff x="0" y="0"/>
+          <a:chExt cx="0" cy="0"/>
+        </a:xfrm>
+      </p:grpSpPr>
+      <p:sp useBgFill="1">
+        <p:nvSpPr>
           <p:cNvPr id="11" name="Rectangle 10">
             <a:extLst>
               <a:ext uri="{FF2B5EF4-FFF2-40B4-BE49-F238E27FC236}">
@@ -24211,387 +25595,6 @@
     <p:extLst>
       <p:ext uri="{BB962C8B-B14F-4D97-AF65-F5344CB8AC3E}">
         <p14:creationId xmlns:p14="http://schemas.microsoft.com/office/powerpoint/2010/main" val="3125436281"/>
-      </p:ext>
-    </p:extLst>
-  </p:cSld>
-  <p:clrMapOvr>
-    <a:masterClrMapping/>
-  </p:clrMapOvr>
-</p:sld>
-</file>
-
-<file path=ppt/slides/slide4.xml><?xml version="1.0" encoding="utf-8"?>
-<p:sld xmlns:a="http://schemas.openxmlformats.org/drawingml/2006/main" xmlns:r="http://schemas.openxmlformats.org/officeDocument/2006/relationships" xmlns:p="http://schemas.openxmlformats.org/presentationml/2006/main">
-  <p:cSld>
-    <p:bg>
-      <p:bgPr>
-        <a:solidFill>
-          <a:schemeClr val="bg1"/>
-        </a:solidFill>
-        <a:effectLst/>
-      </p:bgPr>
-    </p:bg>
-    <p:spTree>
-      <p:nvGrpSpPr>
-        <p:cNvPr id="1" name=""/>
-        <p:cNvGrpSpPr/>
-        <p:nvPr/>
-      </p:nvGrpSpPr>
-      <p:grpSpPr>
-        <a:xfrm>
-          <a:off x="0" y="0"/>
-          <a:ext cx="0" cy="0"/>
-          <a:chOff x="0" y="0"/>
-          <a:chExt cx="0" cy="0"/>
-        </a:xfrm>
-      </p:grpSpPr>
-      <p:sp useBgFill="1">
-        <p:nvSpPr>
-          <p:cNvPr id="19" name="Rectangle 18">
-            <a:extLst>
-              <a:ext uri="{FF2B5EF4-FFF2-40B4-BE49-F238E27FC236}">
-                <a16:creationId xmlns:a16="http://schemas.microsoft.com/office/drawing/2014/main" id="{907EF6B7-1338-4443-8C46-6A318D952DFD}"/>
-              </a:ext>
-              <a:ext uri="{C183D7F6-B498-43B3-948B-1728B52AA6E4}">
-                <adec:decorative xmlns:adec="http://schemas.microsoft.com/office/drawing/2017/decorative" val="1"/>
-              </a:ext>
-            </a:extLst>
-          </p:cNvPr>
-          <p:cNvSpPr>
-            <a:spLocks noGrp="1" noRot="1" noChangeAspect="1" noMove="1" noResize="1" noEditPoints="1" noAdjustHandles="1" noChangeArrowheads="1" noChangeShapeType="1" noTextEdit="1"/>
-          </p:cNvSpPr>
-          <p:nvPr>
-            <p:extLst>
-              <p:ext uri="{386F3935-93C4-4BCD-93E2-E3B085C9AB24}">
-                <p16:designElem xmlns:p16="http://schemas.microsoft.com/office/powerpoint/2015/main" val="1"/>
-              </p:ext>
-            </p:extLst>
-          </p:nvPr>
-        </p:nvSpPr>
-        <p:spPr>
-          <a:xfrm>
-            <a:off x="3048" y="0"/>
-            <a:ext cx="12188952" cy="6858000"/>
-          </a:xfrm>
-          <a:prstGeom prst="rect">
-            <a:avLst/>
-          </a:prstGeom>
-          <a:ln>
-            <a:noFill/>
-          </a:ln>
-        </p:spPr>
-        <p:style>
-          <a:lnRef idx="2">
-            <a:schemeClr val="accent1">
-              <a:shade val="50000"/>
-            </a:schemeClr>
-          </a:lnRef>
-          <a:fillRef idx="1">
-            <a:schemeClr val="accent1"/>
-          </a:fillRef>
-          <a:effectRef idx="0">
-            <a:schemeClr val="accent1"/>
-          </a:effectRef>
-          <a:fontRef idx="minor">
-            <a:schemeClr val="lt1"/>
-          </a:fontRef>
-        </p:style>
-        <p:txBody>
-          <a:bodyPr rtlCol="0" anchor="ctr"/>
-          <a:lstStyle/>
-          <a:p>
-            <a:pPr algn="ctr"/>
-            <a:endParaRPr lang="en-US"/>
-          </a:p>
-        </p:txBody>
-      </p:sp>
-      <p:sp>
-        <p:nvSpPr>
-          <p:cNvPr id="21" name="Freeform: Shape 20">
-            <a:extLst>
-              <a:ext uri="{FF2B5EF4-FFF2-40B4-BE49-F238E27FC236}">
-                <a16:creationId xmlns:a16="http://schemas.microsoft.com/office/drawing/2014/main" id="{DAAE4CDD-124C-4DCF-9584-B6033B545DD5}"/>
-              </a:ext>
-              <a:ext uri="{C183D7F6-B498-43B3-948B-1728B52AA6E4}">
-                <adec:decorative xmlns:adec="http://schemas.microsoft.com/office/drawing/2017/decorative" val="1"/>
-              </a:ext>
-            </a:extLst>
-          </p:cNvPr>
-          <p:cNvSpPr>
-            <a:spLocks noGrp="1" noRot="1" noChangeAspect="1" noMove="1" noResize="1" noEditPoints="1" noAdjustHandles="1" noChangeArrowheads="1" noChangeShapeType="1" noTextEdit="1"/>
-          </p:cNvSpPr>
-          <p:nvPr>
-            <p:extLst>
-              <p:ext uri="{386F3935-93C4-4BCD-93E2-E3B085C9AB24}">
-                <p16:designElem xmlns:p16="http://schemas.microsoft.com/office/powerpoint/2015/main" val="1"/>
-              </p:ext>
-            </p:extLst>
-          </p:nvPr>
-        </p:nvSpPr>
-        <p:spPr>
-          <a:xfrm>
-            <a:off x="1" y="0"/>
-            <a:ext cx="4167271" cy="6858000"/>
-          </a:xfrm>
-          <a:custGeom>
-            <a:avLst/>
-            <a:gdLst>
-              <a:gd name="connsiteX0" fmla="*/ 0 w 4167271"/>
-              <a:gd name="connsiteY0" fmla="*/ 0 h 6858000"/>
-              <a:gd name="connsiteX1" fmla="*/ 2259550 w 4167271"/>
-              <a:gd name="connsiteY1" fmla="*/ 0 h 6858000"/>
-              <a:gd name="connsiteX2" fmla="*/ 2387803 w 4167271"/>
-              <a:gd name="connsiteY2" fmla="*/ 82222 h 6858000"/>
-              <a:gd name="connsiteX3" fmla="*/ 4167271 w 4167271"/>
-              <a:gd name="connsiteY3" fmla="*/ 3429000 h 6858000"/>
-              <a:gd name="connsiteX4" fmla="*/ 2387803 w 4167271"/>
-              <a:gd name="connsiteY4" fmla="*/ 6775779 h 6858000"/>
-              <a:gd name="connsiteX5" fmla="*/ 2259550 w 4167271"/>
-              <a:gd name="connsiteY5" fmla="*/ 6858000 h 6858000"/>
-              <a:gd name="connsiteX6" fmla="*/ 0 w 4167271"/>
-              <a:gd name="connsiteY6" fmla="*/ 6858000 h 6858000"/>
-            </a:gdLst>
-            <a:ahLst/>
-            <a:cxnLst>
-              <a:cxn ang="0">
-                <a:pos x="connsiteX0" y="connsiteY0"/>
-              </a:cxn>
-              <a:cxn ang="0">
-                <a:pos x="connsiteX1" y="connsiteY1"/>
-              </a:cxn>
-              <a:cxn ang="0">
-                <a:pos x="connsiteX2" y="connsiteY2"/>
-              </a:cxn>
-              <a:cxn ang="0">
-                <a:pos x="connsiteX3" y="connsiteY3"/>
-              </a:cxn>
-              <a:cxn ang="0">
-                <a:pos x="connsiteX4" y="connsiteY4"/>
-              </a:cxn>
-              <a:cxn ang="0">
-                <a:pos x="connsiteX5" y="connsiteY5"/>
-              </a:cxn>
-              <a:cxn ang="0">
-                <a:pos x="connsiteX6" y="connsiteY6"/>
-              </a:cxn>
-            </a:cxnLst>
-            <a:rect l="l" t="t" r="r" b="b"/>
-            <a:pathLst>
-              <a:path w="4167271" h="6858000">
-                <a:moveTo>
-                  <a:pt x="0" y="0"/>
-                </a:moveTo>
-                <a:lnTo>
-                  <a:pt x="2259550" y="0"/>
-                </a:lnTo>
-                <a:lnTo>
-                  <a:pt x="2387803" y="82222"/>
-                </a:lnTo>
-                <a:cubicBezTo>
-                  <a:pt x="3461407" y="807534"/>
-                  <a:pt x="4167271" y="2035835"/>
-                  <a:pt x="4167271" y="3429000"/>
-                </a:cubicBezTo>
-                <a:cubicBezTo>
-                  <a:pt x="4167271" y="4822165"/>
-                  <a:pt x="3461407" y="6050467"/>
-                  <a:pt x="2387803" y="6775779"/>
-                </a:cubicBezTo>
-                <a:lnTo>
-                  <a:pt x="2259550" y="6858000"/>
-                </a:lnTo>
-                <a:lnTo>
-                  <a:pt x="0" y="6858000"/>
-                </a:lnTo>
-                <a:close/>
-              </a:path>
-            </a:pathLst>
-          </a:custGeom>
-          <a:solidFill>
-            <a:schemeClr val="accent2"/>
-          </a:solidFill>
-          <a:ln>
-            <a:noFill/>
-          </a:ln>
-        </p:spPr>
-        <p:style>
-          <a:lnRef idx="2">
-            <a:schemeClr val="accent1">
-              <a:shade val="50000"/>
-            </a:schemeClr>
-          </a:lnRef>
-          <a:fillRef idx="1">
-            <a:schemeClr val="accent1"/>
-          </a:fillRef>
-          <a:effectRef idx="0">
-            <a:schemeClr val="accent1"/>
-          </a:effectRef>
-          <a:fontRef idx="minor">
-            <a:schemeClr val="lt1"/>
-          </a:fontRef>
-        </p:style>
-        <p:txBody>
-          <a:bodyPr rtlCol="0" anchor="ctr"/>
-          <a:lstStyle/>
-          <a:p>
-            <a:pPr algn="ctr"/>
-            <a:endParaRPr lang="en-US"/>
-          </a:p>
-        </p:txBody>
-      </p:sp>
-      <p:sp>
-        <p:nvSpPr>
-          <p:cNvPr id="2" name="Titel 1">
-            <a:extLst>
-              <a:ext uri="{FF2B5EF4-FFF2-40B4-BE49-F238E27FC236}">
-                <a16:creationId xmlns:a16="http://schemas.microsoft.com/office/drawing/2014/main" id="{92493E2E-0D32-3F0C-9FF0-3475F04C2619}"/>
-              </a:ext>
-            </a:extLst>
-          </p:cNvPr>
-          <p:cNvSpPr>
-            <a:spLocks noGrp="1"/>
-          </p:cNvSpPr>
-          <p:nvPr>
-            <p:ph type="title"/>
-          </p:nvPr>
-        </p:nvSpPr>
-        <p:spPr>
-          <a:xfrm>
-            <a:off x="686834" y="1153572"/>
-            <a:ext cx="3200400" cy="4461163"/>
-          </a:xfrm>
-        </p:spPr>
-        <p:txBody>
-          <a:bodyPr>
-            <a:normAutofit/>
-          </a:bodyPr>
-          <a:lstStyle/>
-          <a:p>
-            <a:r>
-              <a:rPr lang="de-DE">
-                <a:solidFill>
-                  <a:srgbClr val="FFFFFF"/>
-                </a:solidFill>
-              </a:rPr>
-              <a:t>Entität</a:t>
-            </a:r>
-          </a:p>
-        </p:txBody>
-      </p:sp>
-      <p:sp>
-        <p:nvSpPr>
-          <p:cNvPr id="23" name="Arc 22">
-            <a:extLst>
-              <a:ext uri="{FF2B5EF4-FFF2-40B4-BE49-F238E27FC236}">
-                <a16:creationId xmlns:a16="http://schemas.microsoft.com/office/drawing/2014/main" id="{081E4A58-353D-44AE-B2FC-2A74E2E400F7}"/>
-              </a:ext>
-              <a:ext uri="{C183D7F6-B498-43B3-948B-1728B52AA6E4}">
-                <adec:decorative xmlns:adec="http://schemas.microsoft.com/office/drawing/2017/decorative" val="1"/>
-              </a:ext>
-            </a:extLst>
-          </p:cNvPr>
-          <p:cNvSpPr>
-            <a:spLocks noGrp="1" noRot="1" noChangeAspect="1" noMove="1" noResize="1" noEditPoints="1" noAdjustHandles="1" noChangeArrowheads="1" noChangeShapeType="1" noTextEdit="1"/>
-          </p:cNvSpPr>
-          <p:nvPr>
-            <p:extLst>
-              <p:ext uri="{386F3935-93C4-4BCD-93E2-E3B085C9AB24}">
-                <p16:designElem xmlns:p16="http://schemas.microsoft.com/office/powerpoint/2015/main" val="1"/>
-              </p:ext>
-            </p:extLst>
-          </p:nvPr>
-        </p:nvSpPr>
-        <p:spPr>
-          <a:xfrm flipV="1">
-            <a:off x="7550402" y="2455479"/>
-            <a:ext cx="4083433" cy="4083433"/>
-          </a:xfrm>
-          <a:prstGeom prst="arc">
-            <a:avLst/>
-          </a:prstGeom>
-          <a:ln w="127000" cap="rnd">
-            <a:solidFill>
-              <a:schemeClr val="accent4"/>
-            </a:solidFill>
-            <a:prstDash val="dash"/>
-          </a:ln>
-        </p:spPr>
-        <p:style>
-          <a:lnRef idx="1">
-            <a:schemeClr val="accent1"/>
-          </a:lnRef>
-          <a:fillRef idx="0">
-            <a:schemeClr val="accent1"/>
-          </a:fillRef>
-          <a:effectRef idx="0">
-            <a:schemeClr val="accent1"/>
-          </a:effectRef>
-          <a:fontRef idx="minor">
-            <a:schemeClr val="tx1"/>
-          </a:fontRef>
-        </p:style>
-        <p:txBody>
-          <a:bodyPr rtlCol="0" anchor="ctr"/>
-          <a:lstStyle/>
-          <a:p>
-            <a:pPr algn="ctr"/>
-            <a:endParaRPr lang="en-US" dirty="0"/>
-          </a:p>
-        </p:txBody>
-      </p:sp>
-      <p:sp>
-        <p:nvSpPr>
-          <p:cNvPr id="3" name="Inhaltsplatzhalter 2">
-            <a:extLst>
-              <a:ext uri="{FF2B5EF4-FFF2-40B4-BE49-F238E27FC236}">
-                <a16:creationId xmlns:a16="http://schemas.microsoft.com/office/drawing/2014/main" id="{C11C5233-96BA-B1DB-ACF2-0B9B4483FE94}"/>
-              </a:ext>
-            </a:extLst>
-          </p:cNvPr>
-          <p:cNvSpPr>
-            <a:spLocks noGrp="1"/>
-          </p:cNvSpPr>
-          <p:nvPr>
-            <p:ph idx="1"/>
-          </p:nvPr>
-        </p:nvSpPr>
-        <p:spPr>
-          <a:xfrm>
-            <a:off x="4447308" y="591344"/>
-            <a:ext cx="6906491" cy="5585619"/>
-          </a:xfrm>
-        </p:spPr>
-        <p:txBody>
-          <a:bodyPr anchor="ctr">
-            <a:normAutofit/>
-          </a:bodyPr>
-          <a:lstStyle/>
-          <a:p>
-            <a:r>
-              <a:rPr lang="de-DE" dirty="0"/>
-              <a:t>Als Entität (englisch </a:t>
-            </a:r>
-            <a:r>
-              <a:rPr lang="de-DE" dirty="0" err="1"/>
-              <a:t>entity</a:t>
-            </a:r>
-            <a:r>
-              <a:rPr lang="de-DE" dirty="0"/>
-              <a:t>) wird in der Datenmodellierung ein eindeutig zu bestimmendes Objekt bezeichnet, über das Informationen gespeichert oder verarbeitet werden sollen.</a:t>
-            </a:r>
-          </a:p>
-          <a:p>
-            <a:r>
-              <a:rPr lang="de-DE" dirty="0"/>
-              <a:t>Beispiele: Ein Fahrzeug, ein Konto, eine Person, ein Zustand.</a:t>
-            </a:r>
-          </a:p>
-        </p:txBody>
-      </p:sp>
-    </p:spTree>
-    <p:extLst>
-      <p:ext uri="{BB962C8B-B14F-4D97-AF65-F5344CB8AC3E}">
-        <p14:creationId xmlns:p14="http://schemas.microsoft.com/office/powerpoint/2010/main" val="1553540450"/>
       </p:ext>
     </p:extLst>
   </p:cSld>

</xml_diff>